<commit_message>
Lec 38 slides update
</commit_message>
<xml_diff>
--- a/tyler/meena/cs320/s23/lec/37-clustering2/slides.pptx
+++ b/tyler/meena/cs320/s23/lec/37-clustering2/slides.pptx
@@ -9350,8 +9350,8 @@
         </p:nvSpPr>
         <p:spPr>
           <a:xfrm>
-            <a:off x="642094" y="3790949"/>
-            <a:ext cx="11944772" cy="2844801"/>
+            <a:off x="642094" y="3777059"/>
+            <a:ext cx="12051376" cy="2872581"/>
           </a:xfrm>
           <a:prstGeom prst="rect">
             <a:avLst/>
@@ -9383,10 +9383,11 @@
               </a:defRPr>
             </a:pPr>
             <a:r>
+              <a:rPr dirty="0"/>
               <a:t>From docs: </a:t>
             </a:r>
             <a:r>
-              <a:rPr u="sng">
+              <a:rPr u="sng" dirty="0">
                 <a:hlinkClick r:id="rId2"/>
               </a:rPr>
               <a:t>https://scikit-learn.org/stable/modules/generated/sklearn.cluster.AgglomerativeClustering.html</a:t>
@@ -9410,7 +9411,7 @@
                 <a:sym typeface="Helvetica"/>
               </a:defRPr>
             </a:pPr>
-            <a:endParaRPr u="sng">
+            <a:endParaRPr u="sng" dirty="0">
               <a:hlinkClick r:id="rId2"/>
             </a:endParaRPr>
           </a:p>
@@ -9433,7 +9434,7 @@
               </a:defRPr>
             </a:pPr>
             <a:r>
-              <a:rPr>
+              <a:rPr dirty="0">
                 <a:solidFill>
                   <a:schemeClr val="accent4">
                     <a:hueOff val="-1081314"/>
@@ -9445,10 +9446,13 @@
               <a:t>ward</a:t>
             </a:r>
             <a:r>
+              <a:rPr dirty="0"/>
               <a:t> minimizes the variance of the clusters being merged.</a:t>
             </a:r>
-            <a:br/>
-            <a:endParaRPr/>
+            <a:br>
+              <a:rPr dirty="0"/>
+            </a:br>
+            <a:endParaRPr dirty="0"/>
           </a:p>
           <a:p>
             <a:pPr marL="457200" indent="-317500" algn="l" defTabSz="457200">
@@ -9469,7 +9473,7 @@
               </a:defRPr>
             </a:pPr>
             <a:r>
-              <a:rPr>
+              <a:rPr dirty="0">
                 <a:solidFill>
                   <a:schemeClr val="accent4">
                     <a:hueOff val="-1081314"/>
@@ -9481,10 +9485,13 @@
               <a:t>average</a:t>
             </a:r>
             <a:r>
+              <a:rPr dirty="0"/>
               <a:t> uses the average of the distances of each observation of the two sets.</a:t>
             </a:r>
-            <a:br/>
-            <a:endParaRPr/>
+            <a:br>
+              <a:rPr dirty="0"/>
+            </a:br>
+            <a:endParaRPr dirty="0"/>
           </a:p>
           <a:p>
             <a:pPr marL="457200" indent="-317500" algn="l" defTabSz="457200">
@@ -9505,7 +9512,7 @@
               </a:defRPr>
             </a:pPr>
             <a:r>
-              <a:rPr>
+              <a:rPr dirty="0">
                 <a:solidFill>
                   <a:schemeClr val="accent4">
                     <a:hueOff val="-1081314"/>
@@ -9517,10 +9524,13 @@
               <a:t>complete</a:t>
             </a:r>
             <a:r>
+              <a:rPr dirty="0"/>
               <a:t> or maximum linkage uses the maximum distances between all observations of the two sets.</a:t>
             </a:r>
-            <a:br/>
-            <a:endParaRPr/>
+            <a:br>
+              <a:rPr dirty="0"/>
+            </a:br>
+            <a:endParaRPr dirty="0"/>
           </a:p>
           <a:p>
             <a:pPr marL="457200" indent="-317500" algn="l" defTabSz="457200">
@@ -9541,7 +9551,7 @@
               </a:defRPr>
             </a:pPr>
             <a:r>
-              <a:rPr>
+              <a:rPr dirty="0">
                 <a:solidFill>
                   <a:schemeClr val="accent4">
                     <a:hueOff val="-1081314"/>
@@ -9553,8 +9563,75 @@
               <a:t>single</a:t>
             </a:r>
             <a:r>
+              <a:rPr dirty="0"/>
               <a:t> uses the minimum of the distances between all observations of the two sets.</a:t>
             </a:r>
+          </a:p>
+        </p:txBody>
+      </p:sp>
+      <p:sp>
+        <p:nvSpPr>
+          <p:cNvPr id="2" name="From docs: https://scikit-learn.org/stable/modules/generated/sklearn.cluster.AgglomerativeClustering.html…">
+            <a:extLst>
+              <a:ext uri="{FF2B5EF4-FFF2-40B4-BE49-F238E27FC236}">
+                <a16:creationId xmlns:a16="http://schemas.microsoft.com/office/drawing/2014/main" id="{CDD0D82B-C6D0-E74F-BE6E-B7040CF70ED0}"/>
+              </a:ext>
+            </a:extLst>
+          </p:cNvPr>
+          <p:cNvSpPr txBox="1"/>
+          <p:nvPr/>
+        </p:nvSpPr>
+        <p:spPr>
+          <a:xfrm>
+            <a:off x="282748" y="7143401"/>
+            <a:ext cx="12439303" cy="410369"/>
+          </a:xfrm>
+          <a:prstGeom prst="rect">
+            <a:avLst/>
+          </a:prstGeom>
+          <a:ln w="12700">
+            <a:miter lim="400000"/>
+          </a:ln>
+          <a:extLst>
+            <a:ext uri="{C572A759-6A51-4108-AA02-DFA0A04FC94B}">
+              <ma14:wrappingTextBoxFlag xmlns:ma14="http://schemas.microsoft.com/office/mac/drawingml/2011/main" xmlns:a14="http://schemas.microsoft.com/office/drawing/2010/main" xmlns:m="http://schemas.openxmlformats.org/officeDocument/2006/math" xmlns="" val="1"/>
+            </a:ext>
+          </a:extLst>
+        </p:spPr>
+        <p:txBody>
+          <a:bodyPr wrap="none" lIns="50800" tIns="50800" rIns="50800" bIns="50800" anchor="ctr">
+            <a:spAutoFit/>
+          </a:bodyPr>
+          <a:lstStyle/>
+          <a:p>
+            <a:pPr algn="l" defTabSz="457200">
+              <a:defRPr sz="2000">
+                <a:solidFill>
+                  <a:srgbClr val="212529"/>
+                </a:solidFill>
+                <a:latin typeface="Helvetica"/>
+                <a:ea typeface="Helvetica"/>
+                <a:cs typeface="Helvetica"/>
+                <a:sym typeface="Helvetica"/>
+              </a:defRPr>
+            </a:pPr>
+            <a:r>
+              <a:rPr lang="en-US" dirty="0"/>
+              <a:t>Linkage comparison plots</a:t>
+            </a:r>
+            <a:r>
+              <a:rPr dirty="0"/>
+              <a:t>: </a:t>
+            </a:r>
+            <a:r>
+              <a:rPr lang="en-US" u="sng" dirty="0">
+                <a:hlinkClick r:id="rId2"/>
+              </a:rPr>
+              <a:t>https://scikit-learn.org/stable/auto_examples/cluster/plot_linkage_comparison.html</a:t>
+            </a:r>
+            <a:endParaRPr u="sng" dirty="0">
+              <a:hlinkClick r:id="rId2"/>
+            </a:endParaRPr>
           </a:p>
         </p:txBody>
       </p:sp>

</xml_diff>